<commit_message>
adds missing valid jump line
</commit_message>
<xml_diff>
--- a/instructor/l17/l17-pad.pptx
+++ b/instructor/l17/l17-pad.pptx
@@ -5,7 +5,7 @@
     <p:sldMasterId id="2147483648" r:id="rId1"/>
   </p:sldMasterIdLst>
   <p:notesMasterIdLst>
-    <p:notesMasterId r:id="rId19"/>
+    <p:notesMasterId r:id="rId18"/>
   </p:notesMasterIdLst>
   <p:sldIdLst>
     <p:sldId id="264" r:id="rId2"/>
@@ -16,15 +16,14 @@
     <p:sldId id="282" r:id="rId7"/>
     <p:sldId id="281" r:id="rId8"/>
     <p:sldId id="284" r:id="rId9"/>
-    <p:sldId id="283" r:id="rId10"/>
-    <p:sldId id="272" r:id="rId11"/>
-    <p:sldId id="271" r:id="rId12"/>
-    <p:sldId id="278" r:id="rId13"/>
-    <p:sldId id="279" r:id="rId14"/>
-    <p:sldId id="273" r:id="rId15"/>
-    <p:sldId id="274" r:id="rId16"/>
-    <p:sldId id="275" r:id="rId17"/>
-    <p:sldId id="276" r:id="rId18"/>
+    <p:sldId id="272" r:id="rId10"/>
+    <p:sldId id="271" r:id="rId11"/>
+    <p:sldId id="278" r:id="rId12"/>
+    <p:sldId id="279" r:id="rId13"/>
+    <p:sldId id="273" r:id="rId14"/>
+    <p:sldId id="274" r:id="rId15"/>
+    <p:sldId id="275" r:id="rId16"/>
+    <p:sldId id="276" r:id="rId17"/>
   </p:sldIdLst>
   <p:sldSz cx="12192000" cy="6858000"/>
   <p:notesSz cx="6858000" cy="9144000"/>
@@ -213,7 +212,7 @@
           <a:p>
             <a:fld id="{1FCE8BAE-E92B-F04D-9C6A-88D25E080AF7}" type="datetimeFigureOut">
               <a:rPr lang="en-US" smtClean="0"/>
-              <a:t>11/9/23</a:t>
+              <a:t>11/12/25</a:t>
             </a:fld>
             <a:endParaRPr lang="en-US"/>
           </a:p>
@@ -974,90 +973,6 @@
     </p:spTree>
     <p:extLst>
       <p:ext uri="{BB962C8B-B14F-4D97-AF65-F5344CB8AC3E}">
-        <p14:creationId xmlns:p14="http://schemas.microsoft.com/office/powerpoint/2010/main" val="2405316460"/>
-      </p:ext>
-    </p:extLst>
-  </p:cSld>
-  <p:clrMapOvr>
-    <a:masterClrMapping/>
-  </p:clrMapOvr>
-</p:notes>
-</file>
-
-<file path=ppt/notesSlides/notesSlide7.xml><?xml version="1.0" encoding="utf-8"?>
-<p:notes xmlns:a="http://schemas.openxmlformats.org/drawingml/2006/main" xmlns:r="http://schemas.openxmlformats.org/officeDocument/2006/relationships" xmlns:p="http://schemas.openxmlformats.org/presentationml/2006/main">
-  <p:cSld>
-    <p:spTree>
-      <p:nvGrpSpPr>
-        <p:cNvPr id="1" name=""/>
-        <p:cNvGrpSpPr/>
-        <p:nvPr/>
-      </p:nvGrpSpPr>
-      <p:grpSpPr>
-        <a:xfrm>
-          <a:off x="0" y="0"/>
-          <a:ext cx="0" cy="0"/>
-          <a:chOff x="0" y="0"/>
-          <a:chExt cx="0" cy="0"/>
-        </a:xfrm>
-      </p:grpSpPr>
-      <p:sp>
-        <p:nvSpPr>
-          <p:cNvPr id="2" name="Slide Image Placeholder 1"/>
-          <p:cNvSpPr>
-            <a:spLocks noGrp="1" noRot="1" noChangeAspect="1"/>
-          </p:cNvSpPr>
-          <p:nvPr>
-            <p:ph type="sldImg"/>
-          </p:nvPr>
-        </p:nvSpPr>
-        <p:spPr/>
-      </p:sp>
-      <p:sp>
-        <p:nvSpPr>
-          <p:cNvPr id="3" name="Notes Placeholder 2"/>
-          <p:cNvSpPr>
-            <a:spLocks noGrp="1"/>
-          </p:cNvSpPr>
-          <p:nvPr>
-            <p:ph type="body" idx="1"/>
-          </p:nvPr>
-        </p:nvSpPr>
-        <p:spPr/>
-        <p:txBody>
-          <a:bodyPr/>
-          <a:lstStyle/>
-          <a:p>
-            <a:endParaRPr lang="en-US" dirty="0"/>
-          </a:p>
-        </p:txBody>
-      </p:sp>
-      <p:sp>
-        <p:nvSpPr>
-          <p:cNvPr id="4" name="Slide Number Placeholder 3"/>
-          <p:cNvSpPr>
-            <a:spLocks noGrp="1"/>
-          </p:cNvSpPr>
-          <p:nvPr>
-            <p:ph type="sldNum" sz="quarter" idx="5"/>
-          </p:nvPr>
-        </p:nvSpPr>
-        <p:spPr/>
-        <p:txBody>
-          <a:bodyPr/>
-          <a:lstStyle/>
-          <a:p>
-            <a:fld id="{1485B4E3-EF3B-5D4A-9DA1-BD0670AC6B47}" type="slidenum">
-              <a:rPr lang="en-US" smtClean="0"/>
-              <a:t>10</a:t>
-            </a:fld>
-            <a:endParaRPr lang="en-US"/>
-          </a:p>
-        </p:txBody>
-      </p:sp>
-    </p:spTree>
-    <p:extLst>
-      <p:ext uri="{BB962C8B-B14F-4D97-AF65-F5344CB8AC3E}">
         <p14:creationId xmlns:p14="http://schemas.microsoft.com/office/powerpoint/2010/main" val="1361554954"/>
       </p:ext>
     </p:extLst>
@@ -1215,7 +1130,7 @@
           <a:p>
             <a:fld id="{6901D574-2425-0C44-8C0A-ED186250828B}" type="datetimeFigureOut">
               <a:rPr lang="en-US" smtClean="0"/>
-              <a:t>11/9/23</a:t>
+              <a:t>11/12/25</a:t>
             </a:fld>
             <a:endParaRPr lang="en-US"/>
           </a:p>
@@ -1413,7 +1328,7 @@
           <a:p>
             <a:fld id="{6901D574-2425-0C44-8C0A-ED186250828B}" type="datetimeFigureOut">
               <a:rPr lang="en-US" smtClean="0"/>
-              <a:t>11/9/23</a:t>
+              <a:t>11/12/25</a:t>
             </a:fld>
             <a:endParaRPr lang="en-US"/>
           </a:p>
@@ -1621,7 +1536,7 @@
           <a:p>
             <a:fld id="{6901D574-2425-0C44-8C0A-ED186250828B}" type="datetimeFigureOut">
               <a:rPr lang="en-US" smtClean="0"/>
-              <a:t>11/9/23</a:t>
+              <a:t>11/12/25</a:t>
             </a:fld>
             <a:endParaRPr lang="en-US"/>
           </a:p>
@@ -1819,7 +1734,7 @@
           <a:p>
             <a:fld id="{6901D574-2425-0C44-8C0A-ED186250828B}" type="datetimeFigureOut">
               <a:rPr lang="en-US" smtClean="0"/>
-              <a:t>11/9/23</a:t>
+              <a:t>11/12/25</a:t>
             </a:fld>
             <a:endParaRPr lang="en-US"/>
           </a:p>
@@ -2094,7 +2009,7 @@
           <a:p>
             <a:fld id="{6901D574-2425-0C44-8C0A-ED186250828B}" type="datetimeFigureOut">
               <a:rPr lang="en-US" smtClean="0"/>
-              <a:t>11/9/23</a:t>
+              <a:t>11/12/25</a:t>
             </a:fld>
             <a:endParaRPr lang="en-US"/>
           </a:p>
@@ -2359,7 +2274,7 @@
           <a:p>
             <a:fld id="{6901D574-2425-0C44-8C0A-ED186250828B}" type="datetimeFigureOut">
               <a:rPr lang="en-US" smtClean="0"/>
-              <a:t>11/9/23</a:t>
+              <a:t>11/12/25</a:t>
             </a:fld>
             <a:endParaRPr lang="en-US"/>
           </a:p>
@@ -2771,7 +2686,7 @@
           <a:p>
             <a:fld id="{6901D574-2425-0C44-8C0A-ED186250828B}" type="datetimeFigureOut">
               <a:rPr lang="en-US" smtClean="0"/>
-              <a:t>11/9/23</a:t>
+              <a:t>11/12/25</a:t>
             </a:fld>
             <a:endParaRPr lang="en-US"/>
           </a:p>
@@ -2912,7 +2827,7 @@
           <a:p>
             <a:fld id="{6901D574-2425-0C44-8C0A-ED186250828B}" type="datetimeFigureOut">
               <a:rPr lang="en-US" smtClean="0"/>
-              <a:t>11/9/23</a:t>
+              <a:t>11/12/25</a:t>
             </a:fld>
             <a:endParaRPr lang="en-US"/>
           </a:p>
@@ -3025,7 +2940,7 @@
           <a:p>
             <a:fld id="{6901D574-2425-0C44-8C0A-ED186250828B}" type="datetimeFigureOut">
               <a:rPr lang="en-US" smtClean="0"/>
-              <a:t>11/9/23</a:t>
+              <a:t>11/12/25</a:t>
             </a:fld>
             <a:endParaRPr lang="en-US"/>
           </a:p>
@@ -3336,7 +3251,7 @@
           <a:p>
             <a:fld id="{6901D574-2425-0C44-8C0A-ED186250828B}" type="datetimeFigureOut">
               <a:rPr lang="en-US" smtClean="0"/>
-              <a:t>11/9/23</a:t>
+              <a:t>11/12/25</a:t>
             </a:fld>
             <a:endParaRPr lang="en-US"/>
           </a:p>
@@ -3624,7 +3539,7 @@
           <a:p>
             <a:fld id="{6901D574-2425-0C44-8C0A-ED186250828B}" type="datetimeFigureOut">
               <a:rPr lang="en-US" smtClean="0"/>
-              <a:t>11/9/23</a:t>
+              <a:t>11/12/25</a:t>
             </a:fld>
             <a:endParaRPr lang="en-US"/>
           </a:p>
@@ -3865,7 +3780,7 @@
           <a:p>
             <a:fld id="{6901D574-2425-0C44-8C0A-ED186250828B}" type="datetimeFigureOut">
               <a:rPr lang="en-US" smtClean="0"/>
-              <a:t>11/9/23</a:t>
+              <a:t>11/12/25</a:t>
             </a:fld>
             <a:endParaRPr lang="en-US"/>
           </a:p>
@@ -4327,154 +4242,6 @@
           <p:nvPr/>
         </p:nvPicPr>
         <p:blipFill rotWithShape="1">
-          <a:blip r:embed="rId3"/>
-          <a:srcRect l="63949" t="13878" r="17549" b="75466"/>
-          <a:stretch/>
-        </p:blipFill>
-        <p:spPr>
-          <a:xfrm>
-            <a:off x="4478866" y="2068929"/>
-            <a:ext cx="3234268" cy="1439334"/>
-          </a:xfrm>
-          <a:prstGeom prst="rect">
-            <a:avLst/>
-          </a:prstGeom>
-        </p:spPr>
-      </p:pic>
-      <p:sp>
-        <p:nvSpPr>
-          <p:cNvPr id="6" name="Rectangle 5">
-            <a:extLst>
-              <a:ext uri="{FF2B5EF4-FFF2-40B4-BE49-F238E27FC236}">
-                <a16:creationId xmlns:a16="http://schemas.microsoft.com/office/drawing/2014/main" id="{981F496C-B221-4D44-0044-4ED1578D4239}"/>
-              </a:ext>
-            </a:extLst>
-          </p:cNvPr>
-          <p:cNvSpPr/>
-          <p:nvPr/>
-        </p:nvSpPr>
-        <p:spPr>
-          <a:xfrm>
-            <a:off x="1673157" y="311285"/>
-            <a:ext cx="1712069" cy="622570"/>
-          </a:xfrm>
-          <a:prstGeom prst="rect">
-            <a:avLst/>
-          </a:prstGeom>
-          <a:solidFill>
-            <a:schemeClr val="bg1"/>
-          </a:solidFill>
-          <a:ln>
-            <a:solidFill>
-              <a:schemeClr val="bg1"/>
-            </a:solidFill>
-          </a:ln>
-        </p:spPr>
-        <p:style>
-          <a:lnRef idx="2">
-            <a:schemeClr val="accent1">
-              <a:shade val="50000"/>
-            </a:schemeClr>
-          </a:lnRef>
-          <a:fillRef idx="1">
-            <a:schemeClr val="accent1"/>
-          </a:fillRef>
-          <a:effectRef idx="0">
-            <a:schemeClr val="accent1"/>
-          </a:effectRef>
-          <a:fontRef idx="minor">
-            <a:schemeClr val="lt1"/>
-          </a:fontRef>
-        </p:style>
-        <p:txBody>
-          <a:bodyPr rtlCol="0" anchor="ctr"/>
-          <a:lstStyle/>
-          <a:p>
-            <a:pPr algn="ctr"/>
-            <a:endParaRPr lang="en-US"/>
-          </a:p>
-        </p:txBody>
-      </p:sp>
-      <p:sp>
-        <p:nvSpPr>
-          <p:cNvPr id="2" name="TextBox 1">
-            <a:extLst>
-              <a:ext uri="{FF2B5EF4-FFF2-40B4-BE49-F238E27FC236}">
-                <a16:creationId xmlns:a16="http://schemas.microsoft.com/office/drawing/2014/main" id="{F59B5CC5-653E-5254-DBEB-3338FFFE7EF4}"/>
-              </a:ext>
-            </a:extLst>
-          </p:cNvPr>
-          <p:cNvSpPr txBox="1"/>
-          <p:nvPr/>
-        </p:nvSpPr>
-        <p:spPr>
-          <a:xfrm>
-            <a:off x="554477" y="544749"/>
-            <a:ext cx="4912468" cy="369332"/>
-          </a:xfrm>
-          <a:prstGeom prst="rect">
-            <a:avLst/>
-          </a:prstGeom>
-          <a:noFill/>
-        </p:spPr>
-        <p:txBody>
-          <a:bodyPr wrap="square" rtlCol="0">
-            <a:spAutoFit/>
-          </a:bodyPr>
-          <a:lstStyle/>
-          <a:p>
-            <a:r>
-              <a:rPr lang="en-US" dirty="0"/>
-              <a:t>If we start here - what are possible next states?</a:t>
-            </a:r>
-          </a:p>
-        </p:txBody>
-      </p:sp>
-    </p:spTree>
-    <p:extLst>
-      <p:ext uri="{BB962C8B-B14F-4D97-AF65-F5344CB8AC3E}">
-        <p14:creationId xmlns:p14="http://schemas.microsoft.com/office/powerpoint/2010/main" val="3359691348"/>
-      </p:ext>
-    </p:extLst>
-  </p:cSld>
-  <p:clrMapOvr>
-    <a:masterClrMapping/>
-  </p:clrMapOvr>
-</p:sld>
-</file>
-
-<file path=ppt/slides/slide11.xml><?xml version="1.0" encoding="utf-8"?>
-<p:sld xmlns:a="http://schemas.openxmlformats.org/drawingml/2006/main" xmlns:r="http://schemas.openxmlformats.org/officeDocument/2006/relationships" xmlns:p="http://schemas.openxmlformats.org/presentationml/2006/main">
-  <p:cSld>
-    <p:spTree>
-      <p:nvGrpSpPr>
-        <p:cNvPr id="1" name=""/>
-        <p:cNvGrpSpPr/>
-        <p:nvPr/>
-      </p:nvGrpSpPr>
-      <p:grpSpPr>
-        <a:xfrm>
-          <a:off x="0" y="0"/>
-          <a:ext cx="0" cy="0"/>
-          <a:chOff x="0" y="0"/>
-          <a:chExt cx="0" cy="0"/>
-        </a:xfrm>
-      </p:grpSpPr>
-      <p:pic>
-        <p:nvPicPr>
-          <p:cNvPr id="5" name="Picture 4">
-            <a:extLst>
-              <a:ext uri="{FF2B5EF4-FFF2-40B4-BE49-F238E27FC236}">
-                <a16:creationId xmlns:a16="http://schemas.microsoft.com/office/drawing/2014/main" id="{9781CD3A-35F4-07A4-000F-F5B871B99D04}"/>
-              </a:ext>
-            </a:extLst>
-          </p:cNvPr>
-          <p:cNvPicPr>
-            <a:picLocks noChangeAspect="1"/>
-          </p:cNvPicPr>
-          <p:nvPr/>
-        </p:nvPicPr>
-        <p:blipFill rotWithShape="1">
           <a:blip r:embed="rId2"/>
           <a:srcRect b="63517"/>
           <a:stretch/>
@@ -4645,7 +4412,7 @@
 </p:sld>
 </file>
 
-<file path=ppt/slides/slide12.xml><?xml version="1.0" encoding="utf-8"?>
+<file path=ppt/slides/slide11.xml><?xml version="1.0" encoding="utf-8"?>
 <p:sld xmlns:a="http://schemas.openxmlformats.org/drawingml/2006/main" xmlns:r="http://schemas.openxmlformats.org/officeDocument/2006/relationships" xmlns:p="http://schemas.openxmlformats.org/presentationml/2006/main">
   <p:cSld>
     <p:spTree>
@@ -4885,7 +4652,7 @@
 </p:sld>
 </file>
 
-<file path=ppt/slides/slide13.xml><?xml version="1.0" encoding="utf-8"?>
+<file path=ppt/slides/slide12.xml><?xml version="1.0" encoding="utf-8"?>
 <p:sld xmlns:a="http://schemas.openxmlformats.org/drawingml/2006/main" xmlns:r="http://schemas.openxmlformats.org/officeDocument/2006/relationships" xmlns:p="http://schemas.openxmlformats.org/presentationml/2006/main">
   <p:cSld>
     <p:spTree>
@@ -5082,7 +4849,7 @@
 </p:sld>
 </file>
 
-<file path=ppt/slides/slide14.xml><?xml version="1.0" encoding="utf-8"?>
+<file path=ppt/slides/slide13.xml><?xml version="1.0" encoding="utf-8"?>
 <p:sld xmlns:a="http://schemas.openxmlformats.org/drawingml/2006/main" xmlns:r="http://schemas.openxmlformats.org/officeDocument/2006/relationships" xmlns:p="http://schemas.openxmlformats.org/presentationml/2006/main">
   <p:cSld>
     <p:spTree>
@@ -5304,7 +5071,7 @@
 </p:sld>
 </file>
 
-<file path=ppt/slides/slide15.xml><?xml version="1.0" encoding="utf-8"?>
+<file path=ppt/slides/slide14.xml><?xml version="1.0" encoding="utf-8"?>
 <p:sld xmlns:a="http://schemas.openxmlformats.org/drawingml/2006/main" xmlns:r="http://schemas.openxmlformats.org/officeDocument/2006/relationships" xmlns:p="http://schemas.openxmlformats.org/presentationml/2006/main">
   <p:cSld>
     <p:spTree>
@@ -5334,7 +5101,7 @@
 </p:sld>
 </file>
 
-<file path=ppt/slides/slide16.xml><?xml version="1.0" encoding="utf-8"?>
+<file path=ppt/slides/slide15.xml><?xml version="1.0" encoding="utf-8"?>
 <p:sld xmlns:a="http://schemas.openxmlformats.org/drawingml/2006/main" xmlns:r="http://schemas.openxmlformats.org/officeDocument/2006/relationships" xmlns:p="http://schemas.openxmlformats.org/presentationml/2006/main">
   <p:cSld>
     <p:spTree>
@@ -5885,7 +5652,7 @@
 </p:sld>
 </file>
 
-<file path=ppt/slides/slide17.xml><?xml version="1.0" encoding="utf-8"?>
+<file path=ppt/slides/slide16.xml><?xml version="1.0" encoding="utf-8"?>
 <p:sld xmlns:a="http://schemas.openxmlformats.org/drawingml/2006/main" xmlns:r="http://schemas.openxmlformats.org/officeDocument/2006/relationships" xmlns:p="http://schemas.openxmlformats.org/presentationml/2006/main">
   <p:cSld>
     <p:spTree>
@@ -5985,7 +5752,7 @@
           <a:p>
             <a:r>
               <a:rPr lang="en-US" dirty="0"/>
-              <a:t>Last time – 2 way mazes (down and right only)</a:t>
+              <a:t>Last time – 2-way mazes (down and right only)</a:t>
             </a:r>
           </a:p>
           <a:p>
@@ -6032,7 +5799,7 @@
           <a:p>
             <a:r>
               <a:rPr lang="en-US" dirty="0"/>
-              <a:t>lot’s of problems to practice with</a:t>
+              <a:t>lots of problems to practice with</a:t>
             </a:r>
           </a:p>
           <a:p>
@@ -6715,7 +6482,7 @@
           <a:p>
             <a:r>
               <a:rPr lang="en-US" dirty="0"/>
-              <a:t>next search search states: down and right, UNLESS wall or edges</a:t>
+              <a:t>generated search states: down and right, UNLESS wall or edges</a:t>
             </a:r>
           </a:p>
           <a:p>
@@ -7990,7 +7757,7 @@
                   <a:srgbClr val="FF0000"/>
                 </a:solidFill>
               </a:rPr>
-              <a:t>start</a:t>
+              <a:t>from</a:t>
             </a:r>
           </a:p>
         </p:txBody>
@@ -8235,7 +8002,7 @@
           <a:p>
             <a:r>
               <a:rPr lang="en-US" sz="2800" dirty="0"/>
-              <a:t>   start, over, to</a:t>
+              <a:t>   from, over, to</a:t>
             </a:r>
           </a:p>
           <a:p>
@@ -8247,7 +8014,7 @@
           <a:p>
             <a:r>
               <a:rPr lang="en-US" sz="2800" dirty="0"/>
-              <a:t>   start is full</a:t>
+              <a:t>   from is full</a:t>
             </a:r>
           </a:p>
           <a:p>
@@ -9343,7 +9110,7 @@
           <a:p>
             <a:r>
               <a:rPr lang="en-US" sz="2800" dirty="0"/>
-              <a:t>   start, over, to</a:t>
+              <a:t>   from, over, to</a:t>
             </a:r>
           </a:p>
           <a:p>
@@ -9355,7 +9122,7 @@
           <a:p>
             <a:r>
               <a:rPr lang="en-US" sz="2800" dirty="0"/>
-              <a:t>   start is full</a:t>
+              <a:t>   from is full</a:t>
             </a:r>
           </a:p>
           <a:p>
@@ -9422,66 +9189,6 @@
             <a:chExt cx="4479409" cy="2496761"/>
           </a:xfrm>
         </p:grpSpPr>
-        <p:sp>
-          <p:nvSpPr>
-            <p:cNvPr id="2" name="Donut 1">
-              <a:extLst>
-                <a:ext uri="{FF2B5EF4-FFF2-40B4-BE49-F238E27FC236}">
-                  <a16:creationId xmlns:a16="http://schemas.microsoft.com/office/drawing/2014/main" id="{71F7D900-F2B1-DF9D-B6BE-A23FBA40C4E7}"/>
-                </a:ext>
-              </a:extLst>
-            </p:cNvPr>
-            <p:cNvSpPr/>
-            <p:nvPr/>
-          </p:nvSpPr>
-          <p:spPr>
-            <a:xfrm>
-              <a:off x="4824920" y="2762655"/>
-              <a:ext cx="554477" cy="554477"/>
-            </a:xfrm>
-            <a:prstGeom prst="donut">
-              <a:avLst>
-                <a:gd name="adj" fmla="val 12350"/>
-              </a:avLst>
-            </a:prstGeom>
-            <a:solidFill>
-              <a:schemeClr val="tx1"/>
-            </a:solidFill>
-            <a:ln>
-              <a:solidFill>
-                <a:schemeClr val="tx1"/>
-              </a:solidFill>
-            </a:ln>
-          </p:spPr>
-          <p:style>
-            <a:lnRef idx="2">
-              <a:schemeClr val="accent1">
-                <a:shade val="50000"/>
-              </a:schemeClr>
-            </a:lnRef>
-            <a:fillRef idx="1">
-              <a:schemeClr val="accent1"/>
-            </a:fillRef>
-            <a:effectRef idx="0">
-              <a:schemeClr val="accent1"/>
-            </a:effectRef>
-            <a:fontRef idx="minor">
-              <a:schemeClr val="lt1"/>
-            </a:fontRef>
-          </p:style>
-          <p:txBody>
-            <a:bodyPr rtlCol="0" anchor="ctr"/>
-            <a:lstStyle/>
-            <a:p>
-              <a:pPr algn="ctr"/>
-              <a:endParaRPr lang="en-US">
-                <a:solidFill>
-                  <a:schemeClr val="tx1"/>
-                </a:solidFill>
-              </a:endParaRPr>
-            </a:p>
-          </p:txBody>
-        </p:sp>
         <p:sp>
           <p:nvSpPr>
             <p:cNvPr id="3" name="Donut 2">
@@ -9774,7 +9481,7 @@
             <a:lstStyle/>
             <a:p>
               <a:pPr algn="ctr"/>
-              <a:endParaRPr lang="en-US">
+              <a:endParaRPr lang="en-US" dirty="0">
                 <a:solidFill>
                   <a:schemeClr val="tx1"/>
                 </a:solidFill>
@@ -10277,6 +9984,66 @@
           <p:spPr>
             <a:xfrm>
               <a:off x="7778707" y="3745144"/>
+              <a:ext cx="554477" cy="554477"/>
+            </a:xfrm>
+            <a:prstGeom prst="donut">
+              <a:avLst>
+                <a:gd name="adj" fmla="val 12350"/>
+              </a:avLst>
+            </a:prstGeom>
+            <a:solidFill>
+              <a:schemeClr val="tx1"/>
+            </a:solidFill>
+            <a:ln>
+              <a:solidFill>
+                <a:schemeClr val="tx1"/>
+              </a:solidFill>
+            </a:ln>
+          </p:spPr>
+          <p:style>
+            <a:lnRef idx="2">
+              <a:schemeClr val="accent1">
+                <a:shade val="50000"/>
+              </a:schemeClr>
+            </a:lnRef>
+            <a:fillRef idx="1">
+              <a:schemeClr val="accent1"/>
+            </a:fillRef>
+            <a:effectRef idx="0">
+              <a:schemeClr val="accent1"/>
+            </a:effectRef>
+            <a:fontRef idx="minor">
+              <a:schemeClr val="lt1"/>
+            </a:fontRef>
+          </p:style>
+          <p:txBody>
+            <a:bodyPr rtlCol="0" anchor="ctr"/>
+            <a:lstStyle/>
+            <a:p>
+              <a:pPr algn="ctr"/>
+              <a:endParaRPr lang="en-US">
+                <a:solidFill>
+                  <a:schemeClr val="tx1"/>
+                </a:solidFill>
+              </a:endParaRPr>
+            </a:p>
+          </p:txBody>
+        </p:sp>
+        <p:sp>
+          <p:nvSpPr>
+            <p:cNvPr id="2" name="Donut 1">
+              <a:extLst>
+                <a:ext uri="{FF2B5EF4-FFF2-40B4-BE49-F238E27FC236}">
+                  <a16:creationId xmlns:a16="http://schemas.microsoft.com/office/drawing/2014/main" id="{71F7D900-F2B1-DF9D-B6BE-A23FBA40C4E7}"/>
+                </a:ext>
+              </a:extLst>
+            </p:cNvPr>
+            <p:cNvSpPr/>
+            <p:nvPr/>
+          </p:nvSpPr>
+          <p:spPr>
+            <a:xfrm>
+              <a:off x="4824920" y="2762655"/>
               <a:ext cx="554477" cy="554477"/>
             </a:xfrm>
             <a:prstGeom prst="donut">
@@ -10497,7 +10264,7 @@
           <a:p>
             <a:r>
               <a:rPr lang="en-US" sz="2800" dirty="0"/>
-              <a:t>   start, over, to</a:t>
+              <a:t>   from, over, to</a:t>
             </a:r>
           </a:p>
           <a:p>
@@ -10509,7 +10276,7 @@
           <a:p>
             <a:r>
               <a:rPr lang="en-US" sz="2800" dirty="0"/>
-              <a:t>   start is full</a:t>
+              <a:t>   from is full</a:t>
             </a:r>
           </a:p>
           <a:p>
@@ -10526,6 +10293,50 @@
           </a:p>
         </p:txBody>
       </p:sp>
+      <p:cxnSp>
+        <p:nvCxnSpPr>
+          <p:cNvPr id="43" name="Curved Connector 42">
+            <a:extLst>
+              <a:ext uri="{FF2B5EF4-FFF2-40B4-BE49-F238E27FC236}">
+                <a16:creationId xmlns:a16="http://schemas.microsoft.com/office/drawing/2014/main" id="{F101BF3E-385A-68EE-5BF0-33CE86AC6DE4}"/>
+              </a:ext>
+            </a:extLst>
+          </p:cNvPr>
+          <p:cNvCxnSpPr>
+            <a:cxnSpLocks/>
+          </p:cNvCxnSpPr>
+          <p:nvPr/>
+        </p:nvCxnSpPr>
+        <p:spPr>
+          <a:xfrm rot="8100000" flipH="1" flipV="1">
+            <a:off x="5596274" y="2482289"/>
+            <a:ext cx="1008000" cy="1044000"/>
+          </a:xfrm>
+          <a:prstGeom prst="curvedConnector2">
+            <a:avLst/>
+          </a:prstGeom>
+          <a:ln w="44450">
+            <a:solidFill>
+              <a:srgbClr val="FF0000"/>
+            </a:solidFill>
+            <a:tailEnd type="triangle"/>
+          </a:ln>
+        </p:spPr>
+        <p:style>
+          <a:lnRef idx="1">
+            <a:schemeClr val="accent1"/>
+          </a:lnRef>
+          <a:fillRef idx="0">
+            <a:schemeClr val="accent1"/>
+          </a:fillRef>
+          <a:effectRef idx="0">
+            <a:schemeClr val="accent1"/>
+          </a:effectRef>
+          <a:fontRef idx="minor">
+            <a:schemeClr val="tx1"/>
+          </a:fontRef>
+        </p:style>
+      </p:cxnSp>
     </p:spTree>
     <p:extLst>
       <p:ext uri="{BB962C8B-B14F-4D97-AF65-F5344CB8AC3E}">
@@ -11950,7 +11761,7 @@
           <a:p>
             <a:r>
               <a:rPr lang="en-US" sz="2800" dirty="0"/>
-              <a:t>   start, over, to</a:t>
+              <a:t>   from, over, to</a:t>
             </a:r>
           </a:p>
           <a:p>
@@ -11962,7 +11773,7 @@
           <a:p>
             <a:r>
               <a:rPr lang="en-US" sz="2800" dirty="0"/>
-              <a:t>   start is full</a:t>
+              <a:t>   from is full</a:t>
             </a:r>
           </a:p>
           <a:p>
@@ -11979,6 +11790,50 @@
           </a:p>
         </p:txBody>
       </p:sp>
+      <p:cxnSp>
+        <p:nvCxnSpPr>
+          <p:cNvPr id="25" name="Curved Connector 24">
+            <a:extLst>
+              <a:ext uri="{FF2B5EF4-FFF2-40B4-BE49-F238E27FC236}">
+                <a16:creationId xmlns:a16="http://schemas.microsoft.com/office/drawing/2014/main" id="{84442FD3-0227-AD1F-A244-158C86DD9AC2}"/>
+              </a:ext>
+            </a:extLst>
+          </p:cNvPr>
+          <p:cNvCxnSpPr>
+            <a:cxnSpLocks/>
+          </p:cNvCxnSpPr>
+          <p:nvPr/>
+        </p:nvCxnSpPr>
+        <p:spPr>
+          <a:xfrm rot="8100000" flipH="1" flipV="1">
+            <a:off x="5596274" y="2482289"/>
+            <a:ext cx="1008000" cy="1044000"/>
+          </a:xfrm>
+          <a:prstGeom prst="curvedConnector2">
+            <a:avLst/>
+          </a:prstGeom>
+          <a:ln w="44450">
+            <a:solidFill>
+              <a:srgbClr val="FF0000"/>
+            </a:solidFill>
+            <a:tailEnd type="triangle"/>
+          </a:ln>
+        </p:spPr>
+        <p:style>
+          <a:lnRef idx="1">
+            <a:schemeClr val="accent1"/>
+          </a:lnRef>
+          <a:fillRef idx="0">
+            <a:schemeClr val="accent1"/>
+          </a:fillRef>
+          <a:effectRef idx="0">
+            <a:schemeClr val="accent1"/>
+          </a:effectRef>
+          <a:fontRef idx="minor">
+            <a:schemeClr val="tx1"/>
+          </a:fontRef>
+        </p:style>
+      </p:cxnSp>
     </p:spTree>
     <p:extLst>
       <p:ext uri="{BB962C8B-B14F-4D97-AF65-F5344CB8AC3E}">
@@ -12009,1071 +11864,95 @@
           <a:chExt cx="0" cy="0"/>
         </a:xfrm>
       </p:grpSpPr>
-      <p:grpSp>
-        <p:nvGrpSpPr>
-          <p:cNvPr id="19" name="Group 18">
+      <p:pic>
+        <p:nvPicPr>
+          <p:cNvPr id="5" name="Picture 4">
             <a:extLst>
               <a:ext uri="{FF2B5EF4-FFF2-40B4-BE49-F238E27FC236}">
-                <a16:creationId xmlns:a16="http://schemas.microsoft.com/office/drawing/2014/main" id="{684CBC91-29FA-BC42-F3F8-B4F8FD167163}"/>
+                <a16:creationId xmlns:a16="http://schemas.microsoft.com/office/drawing/2014/main" id="{9781CD3A-35F4-07A4-000F-F5B871B99D04}"/>
               </a:ext>
             </a:extLst>
           </p:cNvPr>
-          <p:cNvGrpSpPr/>
+          <p:cNvPicPr>
+            <a:picLocks noChangeAspect="1"/>
+          </p:cNvPicPr>
           <p:nvPr/>
-        </p:nvGrpSpPr>
-        <p:grpSpPr>
+        </p:nvPicPr>
+        <p:blipFill rotWithShape="1">
+          <a:blip r:embed="rId3"/>
+          <a:srcRect l="63949" t="13878" r="17549" b="75466"/>
+          <a:stretch/>
+        </p:blipFill>
+        <p:spPr>
           <a:xfrm>
-            <a:off x="3856295" y="1815830"/>
-            <a:ext cx="4479409" cy="2496761"/>
-            <a:chOff x="3853775" y="1815830"/>
-            <a:chExt cx="4479409" cy="2496761"/>
+            <a:off x="4478866" y="2068929"/>
+            <a:ext cx="3234268" cy="1439334"/>
           </a:xfrm>
-        </p:grpSpPr>
-        <p:sp>
-          <p:nvSpPr>
-            <p:cNvPr id="2" name="Donut 1">
-              <a:extLst>
-                <a:ext uri="{FF2B5EF4-FFF2-40B4-BE49-F238E27FC236}">
-                  <a16:creationId xmlns:a16="http://schemas.microsoft.com/office/drawing/2014/main" id="{71F7D900-F2B1-DF9D-B6BE-A23FBA40C4E7}"/>
-                </a:ext>
-              </a:extLst>
-            </p:cNvPr>
-            <p:cNvSpPr/>
-            <p:nvPr/>
-          </p:nvSpPr>
-          <p:spPr>
-            <a:xfrm>
-              <a:off x="4824920" y="2762655"/>
-              <a:ext cx="554477" cy="554477"/>
-            </a:xfrm>
-            <a:prstGeom prst="donut">
-              <a:avLst>
-                <a:gd name="adj" fmla="val 12350"/>
-              </a:avLst>
-            </a:prstGeom>
-            <a:solidFill>
-              <a:schemeClr val="tx1"/>
-            </a:solidFill>
-            <a:ln>
-              <a:solidFill>
-                <a:schemeClr val="tx1"/>
-              </a:solidFill>
-            </a:ln>
-          </p:spPr>
-          <p:style>
-            <a:lnRef idx="2">
-              <a:schemeClr val="accent1">
-                <a:shade val="50000"/>
-              </a:schemeClr>
-            </a:lnRef>
-            <a:fillRef idx="1">
-              <a:schemeClr val="accent1"/>
-            </a:fillRef>
-            <a:effectRef idx="0">
-              <a:schemeClr val="accent1"/>
-            </a:effectRef>
-            <a:fontRef idx="minor">
-              <a:schemeClr val="lt1"/>
-            </a:fontRef>
-          </p:style>
-          <p:txBody>
-            <a:bodyPr rtlCol="0" anchor="ctr"/>
-            <a:lstStyle/>
-            <a:p>
-              <a:pPr algn="ctr"/>
-              <a:endParaRPr lang="en-US">
-                <a:solidFill>
-                  <a:schemeClr val="tx1"/>
-                </a:solidFill>
-              </a:endParaRPr>
-            </a:p>
-          </p:txBody>
-        </p:sp>
-        <p:sp>
-          <p:nvSpPr>
-            <p:cNvPr id="3" name="Donut 2">
-              <a:extLst>
-                <a:ext uri="{FF2B5EF4-FFF2-40B4-BE49-F238E27FC236}">
-                  <a16:creationId xmlns:a16="http://schemas.microsoft.com/office/drawing/2014/main" id="{90D8C362-E501-3FAE-7990-0A78154D53AC}"/>
-                </a:ext>
-              </a:extLst>
-            </p:cNvPr>
-            <p:cNvSpPr/>
-            <p:nvPr/>
-          </p:nvSpPr>
-          <p:spPr>
-            <a:xfrm>
-              <a:off x="5818760" y="1815830"/>
-              <a:ext cx="554477" cy="554477"/>
-            </a:xfrm>
-            <a:prstGeom prst="donut">
-              <a:avLst>
-                <a:gd name="adj" fmla="val 12350"/>
-              </a:avLst>
-            </a:prstGeom>
-            <a:solidFill>
-              <a:schemeClr val="tx1"/>
-            </a:solidFill>
-            <a:ln>
-              <a:solidFill>
-                <a:schemeClr val="tx1"/>
-              </a:solidFill>
-            </a:ln>
-          </p:spPr>
-          <p:style>
-            <a:lnRef idx="2">
-              <a:schemeClr val="accent1">
-                <a:shade val="50000"/>
-              </a:schemeClr>
-            </a:lnRef>
-            <a:fillRef idx="1">
-              <a:schemeClr val="accent1"/>
-            </a:fillRef>
-            <a:effectRef idx="0">
-              <a:schemeClr val="accent1"/>
-            </a:effectRef>
-            <a:fontRef idx="minor">
-              <a:schemeClr val="lt1"/>
-            </a:fontRef>
-          </p:style>
-          <p:txBody>
-            <a:bodyPr rtlCol="0" anchor="ctr"/>
-            <a:lstStyle/>
-            <a:p>
-              <a:pPr algn="ctr"/>
-              <a:endParaRPr lang="en-US">
-                <a:solidFill>
-                  <a:schemeClr val="tx1"/>
-                </a:solidFill>
-              </a:endParaRPr>
-            </a:p>
-          </p:txBody>
-        </p:sp>
-        <p:sp>
-          <p:nvSpPr>
-            <p:cNvPr id="4" name="Donut 3">
-              <a:extLst>
-                <a:ext uri="{FF2B5EF4-FFF2-40B4-BE49-F238E27FC236}">
-                  <a16:creationId xmlns:a16="http://schemas.microsoft.com/office/drawing/2014/main" id="{B6F8762C-ED67-08B0-9E5C-D985B0BBFB4E}"/>
-                </a:ext>
-              </a:extLst>
-            </p:cNvPr>
-            <p:cNvSpPr/>
-            <p:nvPr/>
-          </p:nvSpPr>
-          <p:spPr>
-            <a:xfrm>
-              <a:off x="5311302" y="2305455"/>
-              <a:ext cx="554477" cy="554477"/>
-            </a:xfrm>
-            <a:prstGeom prst="donut">
-              <a:avLst>
-                <a:gd name="adj" fmla="val 12350"/>
-              </a:avLst>
-            </a:prstGeom>
-            <a:solidFill>
-              <a:schemeClr val="tx1"/>
-            </a:solidFill>
-            <a:ln>
-              <a:solidFill>
-                <a:schemeClr val="tx1"/>
-              </a:solidFill>
-            </a:ln>
-          </p:spPr>
-          <p:style>
-            <a:lnRef idx="2">
-              <a:schemeClr val="accent1">
-                <a:shade val="50000"/>
-              </a:schemeClr>
-            </a:lnRef>
-            <a:fillRef idx="1">
-              <a:schemeClr val="accent1"/>
-            </a:fillRef>
-            <a:effectRef idx="0">
-              <a:schemeClr val="accent1"/>
-            </a:effectRef>
-            <a:fontRef idx="minor">
-              <a:schemeClr val="lt1"/>
-            </a:fontRef>
-          </p:style>
-          <p:txBody>
-            <a:bodyPr rtlCol="0" anchor="ctr"/>
-            <a:lstStyle/>
-            <a:p>
-              <a:pPr algn="ctr"/>
-              <a:endParaRPr lang="en-US">
-                <a:solidFill>
-                  <a:schemeClr val="tx1"/>
-                </a:solidFill>
-              </a:endParaRPr>
-            </a:p>
-          </p:txBody>
-        </p:sp>
-        <p:sp>
-          <p:nvSpPr>
-            <p:cNvPr id="7" name="Donut 6">
-              <a:extLst>
-                <a:ext uri="{FF2B5EF4-FFF2-40B4-BE49-F238E27FC236}">
-                  <a16:creationId xmlns:a16="http://schemas.microsoft.com/office/drawing/2014/main" id="{F16E46F1-976B-4AF7-6F41-F72723B61535}"/>
-                </a:ext>
-              </a:extLst>
-            </p:cNvPr>
-            <p:cNvSpPr/>
-            <p:nvPr/>
-          </p:nvSpPr>
-          <p:spPr>
-            <a:xfrm>
-              <a:off x="6297035" y="2305454"/>
-              <a:ext cx="554477" cy="554477"/>
-            </a:xfrm>
-            <a:prstGeom prst="donut">
-              <a:avLst>
-                <a:gd name="adj" fmla="val 12350"/>
-              </a:avLst>
-            </a:prstGeom>
-            <a:solidFill>
-              <a:schemeClr val="tx1"/>
-            </a:solidFill>
-            <a:ln>
-              <a:solidFill>
-                <a:schemeClr val="tx1"/>
-              </a:solidFill>
-            </a:ln>
-          </p:spPr>
-          <p:style>
-            <a:lnRef idx="2">
-              <a:schemeClr val="accent1">
-                <a:shade val="50000"/>
-              </a:schemeClr>
-            </a:lnRef>
-            <a:fillRef idx="1">
-              <a:schemeClr val="accent1"/>
-            </a:fillRef>
-            <a:effectRef idx="0">
-              <a:schemeClr val="accent1"/>
-            </a:effectRef>
-            <a:fontRef idx="minor">
-              <a:schemeClr val="lt1"/>
-            </a:fontRef>
-          </p:style>
-          <p:txBody>
-            <a:bodyPr rtlCol="0" anchor="ctr"/>
-            <a:lstStyle/>
-            <a:p>
-              <a:pPr algn="ctr"/>
-              <a:endParaRPr lang="en-US">
-                <a:solidFill>
-                  <a:schemeClr val="tx1"/>
-                </a:solidFill>
-              </a:endParaRPr>
-            </a:p>
-          </p:txBody>
-        </p:sp>
-        <p:sp>
-          <p:nvSpPr>
-            <p:cNvPr id="8" name="Donut 7">
-              <a:extLst>
-                <a:ext uri="{FF2B5EF4-FFF2-40B4-BE49-F238E27FC236}">
-                  <a16:creationId xmlns:a16="http://schemas.microsoft.com/office/drawing/2014/main" id="{2F311FA9-205B-99A7-5B49-37E2DB3C29E1}"/>
-                </a:ext>
-              </a:extLst>
-            </p:cNvPr>
-            <p:cNvSpPr/>
-            <p:nvPr/>
-          </p:nvSpPr>
-          <p:spPr>
-            <a:xfrm>
-              <a:off x="5832019" y="2762654"/>
-              <a:ext cx="554477" cy="554477"/>
-            </a:xfrm>
-            <a:prstGeom prst="donut">
-              <a:avLst>
-                <a:gd name="adj" fmla="val 12350"/>
-              </a:avLst>
-            </a:prstGeom>
-            <a:solidFill>
-              <a:schemeClr val="tx1"/>
-            </a:solidFill>
-            <a:ln>
-              <a:solidFill>
-                <a:schemeClr val="tx1"/>
-              </a:solidFill>
-            </a:ln>
-          </p:spPr>
-          <p:style>
-            <a:lnRef idx="2">
-              <a:schemeClr val="accent1">
-                <a:shade val="50000"/>
-              </a:schemeClr>
-            </a:lnRef>
-            <a:fillRef idx="1">
-              <a:schemeClr val="accent1"/>
-            </a:fillRef>
-            <a:effectRef idx="0">
-              <a:schemeClr val="accent1"/>
-            </a:effectRef>
-            <a:fontRef idx="minor">
-              <a:schemeClr val="lt1"/>
-            </a:fontRef>
-          </p:style>
-          <p:txBody>
-            <a:bodyPr rtlCol="0" anchor="ctr"/>
-            <a:lstStyle/>
-            <a:p>
-              <a:pPr algn="ctr"/>
-              <a:endParaRPr lang="en-US">
-                <a:solidFill>
-                  <a:schemeClr val="tx1"/>
-                </a:solidFill>
-              </a:endParaRPr>
-            </a:p>
-          </p:txBody>
-        </p:sp>
-        <p:sp>
-          <p:nvSpPr>
-            <p:cNvPr id="9" name="Donut 8">
-              <a:extLst>
-                <a:ext uri="{FF2B5EF4-FFF2-40B4-BE49-F238E27FC236}">
-                  <a16:creationId xmlns:a16="http://schemas.microsoft.com/office/drawing/2014/main" id="{639BF7D3-F17B-B37E-5B47-9FD56E50571D}"/>
-                </a:ext>
-              </a:extLst>
-            </p:cNvPr>
-            <p:cNvSpPr/>
-            <p:nvPr/>
-          </p:nvSpPr>
-          <p:spPr>
-            <a:xfrm>
-              <a:off x="6803164" y="2775622"/>
-              <a:ext cx="554477" cy="554477"/>
-            </a:xfrm>
-            <a:prstGeom prst="donut">
-              <a:avLst>
-                <a:gd name="adj" fmla="val 12350"/>
-              </a:avLst>
-            </a:prstGeom>
-            <a:solidFill>
-              <a:schemeClr val="tx1"/>
-            </a:solidFill>
-            <a:ln>
-              <a:solidFill>
-                <a:schemeClr val="tx1"/>
-              </a:solidFill>
-            </a:ln>
-          </p:spPr>
-          <p:style>
-            <a:lnRef idx="2">
-              <a:schemeClr val="accent1">
-                <a:shade val="50000"/>
-              </a:schemeClr>
-            </a:lnRef>
-            <a:fillRef idx="1">
-              <a:schemeClr val="accent1"/>
-            </a:fillRef>
-            <a:effectRef idx="0">
-              <a:schemeClr val="accent1"/>
-            </a:effectRef>
-            <a:fontRef idx="minor">
-              <a:schemeClr val="lt1"/>
-            </a:fontRef>
-          </p:style>
-          <p:txBody>
-            <a:bodyPr rtlCol="0" anchor="ctr"/>
-            <a:lstStyle/>
-            <a:p>
-              <a:pPr algn="ctr"/>
-              <a:endParaRPr lang="en-US">
-                <a:solidFill>
-                  <a:schemeClr val="tx1"/>
-                </a:solidFill>
-              </a:endParaRPr>
-            </a:p>
-          </p:txBody>
-        </p:sp>
-        <p:sp>
-          <p:nvSpPr>
-            <p:cNvPr id="10" name="Donut 9">
-              <a:extLst>
-                <a:ext uri="{FF2B5EF4-FFF2-40B4-BE49-F238E27FC236}">
-                  <a16:creationId xmlns:a16="http://schemas.microsoft.com/office/drawing/2014/main" id="{3164726A-0787-E8DE-9F9C-F0DE6213D288}"/>
-                </a:ext>
-              </a:extLst>
-            </p:cNvPr>
-            <p:cNvSpPr/>
-            <p:nvPr/>
-          </p:nvSpPr>
-          <p:spPr>
-            <a:xfrm>
-              <a:off x="4338248" y="3237688"/>
-              <a:ext cx="554477" cy="554477"/>
-            </a:xfrm>
-            <a:prstGeom prst="donut">
-              <a:avLst>
-                <a:gd name="adj" fmla="val 12350"/>
-              </a:avLst>
-            </a:prstGeom>
-            <a:solidFill>
-              <a:schemeClr val="tx1"/>
-            </a:solidFill>
-            <a:ln>
-              <a:solidFill>
-                <a:schemeClr val="tx1"/>
-              </a:solidFill>
-            </a:ln>
-          </p:spPr>
-          <p:style>
-            <a:lnRef idx="2">
-              <a:schemeClr val="accent1">
-                <a:shade val="50000"/>
-              </a:schemeClr>
-            </a:lnRef>
-            <a:fillRef idx="1">
-              <a:schemeClr val="accent1"/>
-            </a:fillRef>
-            <a:effectRef idx="0">
-              <a:schemeClr val="accent1"/>
-            </a:effectRef>
-            <a:fontRef idx="minor">
-              <a:schemeClr val="lt1"/>
-            </a:fontRef>
-          </p:style>
-          <p:txBody>
-            <a:bodyPr rtlCol="0" anchor="ctr"/>
-            <a:lstStyle/>
-            <a:p>
-              <a:pPr algn="ctr"/>
-              <a:endParaRPr lang="en-US">
-                <a:solidFill>
-                  <a:schemeClr val="tx1"/>
-                </a:solidFill>
-              </a:endParaRPr>
-            </a:p>
-          </p:txBody>
-        </p:sp>
-        <p:sp>
-          <p:nvSpPr>
-            <p:cNvPr id="11" name="Donut 10">
-              <a:extLst>
-                <a:ext uri="{FF2B5EF4-FFF2-40B4-BE49-F238E27FC236}">
-                  <a16:creationId xmlns:a16="http://schemas.microsoft.com/office/drawing/2014/main" id="{4F780523-A4F7-8910-52F4-54394CA75BA7}"/>
-                </a:ext>
-              </a:extLst>
-            </p:cNvPr>
-            <p:cNvSpPr/>
-            <p:nvPr/>
-          </p:nvSpPr>
-          <p:spPr>
-            <a:xfrm>
-              <a:off x="5345347" y="3237687"/>
-              <a:ext cx="554477" cy="554477"/>
-            </a:xfrm>
-            <a:prstGeom prst="donut">
-              <a:avLst>
-                <a:gd name="adj" fmla="val 12350"/>
-              </a:avLst>
-            </a:prstGeom>
-            <a:solidFill>
-              <a:schemeClr val="tx1"/>
-            </a:solidFill>
-            <a:ln>
-              <a:solidFill>
-                <a:schemeClr val="tx1"/>
-              </a:solidFill>
-            </a:ln>
-          </p:spPr>
-          <p:style>
-            <a:lnRef idx="2">
-              <a:schemeClr val="accent1">
-                <a:shade val="50000"/>
-              </a:schemeClr>
-            </a:lnRef>
-            <a:fillRef idx="1">
-              <a:schemeClr val="accent1"/>
-            </a:fillRef>
-            <a:effectRef idx="0">
-              <a:schemeClr val="accent1"/>
-            </a:effectRef>
-            <a:fontRef idx="minor">
-              <a:schemeClr val="lt1"/>
-            </a:fontRef>
-          </p:style>
-          <p:txBody>
-            <a:bodyPr rtlCol="0" anchor="ctr"/>
-            <a:lstStyle/>
-            <a:p>
-              <a:pPr algn="ctr"/>
-              <a:endParaRPr lang="en-US">
-                <a:solidFill>
-                  <a:schemeClr val="tx1"/>
-                </a:solidFill>
-              </a:endParaRPr>
-            </a:p>
-          </p:txBody>
-        </p:sp>
-        <p:sp>
-          <p:nvSpPr>
-            <p:cNvPr id="12" name="Donut 11">
-              <a:extLst>
-                <a:ext uri="{FF2B5EF4-FFF2-40B4-BE49-F238E27FC236}">
-                  <a16:creationId xmlns:a16="http://schemas.microsoft.com/office/drawing/2014/main" id="{3C5FEA32-E5EF-B80E-2C25-6A1B7AC31A42}"/>
-                </a:ext>
-              </a:extLst>
-            </p:cNvPr>
-            <p:cNvSpPr/>
-            <p:nvPr/>
-          </p:nvSpPr>
-          <p:spPr>
-            <a:xfrm>
-              <a:off x="6316492" y="3250655"/>
-              <a:ext cx="554477" cy="554477"/>
-            </a:xfrm>
-            <a:prstGeom prst="donut">
-              <a:avLst>
-                <a:gd name="adj" fmla="val 12350"/>
-              </a:avLst>
-            </a:prstGeom>
-            <a:solidFill>
-              <a:schemeClr val="tx1"/>
-            </a:solidFill>
-            <a:ln>
-              <a:solidFill>
-                <a:schemeClr val="tx1"/>
-              </a:solidFill>
-            </a:ln>
-          </p:spPr>
-          <p:style>
-            <a:lnRef idx="2">
-              <a:schemeClr val="accent1">
-                <a:shade val="50000"/>
-              </a:schemeClr>
-            </a:lnRef>
-            <a:fillRef idx="1">
-              <a:schemeClr val="accent1"/>
-            </a:fillRef>
-            <a:effectRef idx="0">
-              <a:schemeClr val="accent1"/>
-            </a:effectRef>
-            <a:fontRef idx="minor">
-              <a:schemeClr val="lt1"/>
-            </a:fontRef>
-          </p:style>
-          <p:txBody>
-            <a:bodyPr rtlCol="0" anchor="ctr"/>
-            <a:lstStyle/>
-            <a:p>
-              <a:pPr algn="ctr"/>
-              <a:endParaRPr lang="en-US">
-                <a:solidFill>
-                  <a:schemeClr val="tx1"/>
-                </a:solidFill>
-              </a:endParaRPr>
-            </a:p>
-          </p:txBody>
-        </p:sp>
-        <p:sp>
-          <p:nvSpPr>
-            <p:cNvPr id="13" name="Donut 12">
-              <a:extLst>
-                <a:ext uri="{FF2B5EF4-FFF2-40B4-BE49-F238E27FC236}">
-                  <a16:creationId xmlns:a16="http://schemas.microsoft.com/office/drawing/2014/main" id="{FB85F9E0-2565-41CF-A2CD-6BE7C65DE490}"/>
-                </a:ext>
-              </a:extLst>
-            </p:cNvPr>
-            <p:cNvSpPr/>
-            <p:nvPr/>
-          </p:nvSpPr>
-          <p:spPr>
-            <a:xfrm>
-              <a:off x="7289836" y="3237686"/>
-              <a:ext cx="554477" cy="554477"/>
-            </a:xfrm>
-            <a:prstGeom prst="donut">
-              <a:avLst>
-                <a:gd name="adj" fmla="val 12350"/>
-              </a:avLst>
-            </a:prstGeom>
-            <a:solidFill>
-              <a:schemeClr val="tx1"/>
-            </a:solidFill>
-            <a:ln>
-              <a:solidFill>
-                <a:schemeClr val="tx1"/>
-              </a:solidFill>
-            </a:ln>
-          </p:spPr>
-          <p:style>
-            <a:lnRef idx="2">
-              <a:schemeClr val="accent1">
-                <a:shade val="50000"/>
-              </a:schemeClr>
-            </a:lnRef>
-            <a:fillRef idx="1">
-              <a:schemeClr val="accent1"/>
-            </a:fillRef>
-            <a:effectRef idx="0">
-              <a:schemeClr val="accent1"/>
-            </a:effectRef>
-            <a:fontRef idx="minor">
-              <a:schemeClr val="lt1"/>
-            </a:fontRef>
-          </p:style>
-          <p:txBody>
-            <a:bodyPr rtlCol="0" anchor="ctr"/>
-            <a:lstStyle/>
-            <a:p>
-              <a:pPr algn="ctr"/>
-              <a:endParaRPr lang="en-US">
-                <a:solidFill>
-                  <a:schemeClr val="tx1"/>
-                </a:solidFill>
-              </a:endParaRPr>
-            </a:p>
-          </p:txBody>
-        </p:sp>
-        <p:sp>
-          <p:nvSpPr>
-            <p:cNvPr id="14" name="Donut 13">
-              <a:extLst>
-                <a:ext uri="{FF2B5EF4-FFF2-40B4-BE49-F238E27FC236}">
-                  <a16:creationId xmlns:a16="http://schemas.microsoft.com/office/drawing/2014/main" id="{F8582A47-B199-F4E3-B362-47EE03889D0C}"/>
-                </a:ext>
-              </a:extLst>
-            </p:cNvPr>
-            <p:cNvSpPr/>
-            <p:nvPr/>
-          </p:nvSpPr>
-          <p:spPr>
-            <a:xfrm>
-              <a:off x="3853775" y="3745147"/>
-              <a:ext cx="554477" cy="554477"/>
-            </a:xfrm>
-            <a:prstGeom prst="donut">
-              <a:avLst>
-                <a:gd name="adj" fmla="val 12350"/>
-              </a:avLst>
-            </a:prstGeom>
-            <a:solidFill>
-              <a:schemeClr val="tx1"/>
-            </a:solidFill>
-            <a:ln>
-              <a:solidFill>
-                <a:schemeClr val="tx1"/>
-              </a:solidFill>
-            </a:ln>
-          </p:spPr>
-          <p:style>
-            <a:lnRef idx="2">
-              <a:schemeClr val="accent1">
-                <a:shade val="50000"/>
-              </a:schemeClr>
-            </a:lnRef>
-            <a:fillRef idx="1">
-              <a:schemeClr val="accent1"/>
-            </a:fillRef>
-            <a:effectRef idx="0">
-              <a:schemeClr val="accent1"/>
-            </a:effectRef>
-            <a:fontRef idx="minor">
-              <a:schemeClr val="lt1"/>
-            </a:fontRef>
-          </p:style>
-          <p:txBody>
-            <a:bodyPr rtlCol="0" anchor="ctr"/>
-            <a:lstStyle/>
-            <a:p>
-              <a:pPr algn="ctr"/>
-              <a:endParaRPr lang="en-US">
-                <a:solidFill>
-                  <a:schemeClr val="tx1"/>
-                </a:solidFill>
-              </a:endParaRPr>
-            </a:p>
-          </p:txBody>
-        </p:sp>
-        <p:sp>
-          <p:nvSpPr>
-            <p:cNvPr id="15" name="Donut 14">
-              <a:extLst>
-                <a:ext uri="{FF2B5EF4-FFF2-40B4-BE49-F238E27FC236}">
-                  <a16:creationId xmlns:a16="http://schemas.microsoft.com/office/drawing/2014/main" id="{174EA6C7-07F1-395A-F3A4-03E0E7DFD0F3}"/>
-                </a:ext>
-              </a:extLst>
-            </p:cNvPr>
-            <p:cNvSpPr/>
-            <p:nvPr/>
-          </p:nvSpPr>
-          <p:spPr>
-            <a:xfrm>
-              <a:off x="4860874" y="3745146"/>
-              <a:ext cx="554477" cy="554477"/>
-            </a:xfrm>
-            <a:prstGeom prst="donut">
-              <a:avLst>
-                <a:gd name="adj" fmla="val 12350"/>
-              </a:avLst>
-            </a:prstGeom>
-            <a:solidFill>
-              <a:schemeClr val="tx1"/>
-            </a:solidFill>
-            <a:ln>
-              <a:solidFill>
-                <a:schemeClr val="tx1"/>
-              </a:solidFill>
-            </a:ln>
-          </p:spPr>
-          <p:style>
-            <a:lnRef idx="2">
-              <a:schemeClr val="accent1">
-                <a:shade val="50000"/>
-              </a:schemeClr>
-            </a:lnRef>
-            <a:fillRef idx="1">
-              <a:schemeClr val="accent1"/>
-            </a:fillRef>
-            <a:effectRef idx="0">
-              <a:schemeClr val="accent1"/>
-            </a:effectRef>
-            <a:fontRef idx="minor">
-              <a:schemeClr val="lt1"/>
-            </a:fontRef>
-          </p:style>
-          <p:txBody>
-            <a:bodyPr rtlCol="0" anchor="ctr"/>
-            <a:lstStyle/>
-            <a:p>
-              <a:pPr algn="ctr"/>
-              <a:endParaRPr lang="en-US">
-                <a:solidFill>
-                  <a:schemeClr val="tx1"/>
-                </a:solidFill>
-              </a:endParaRPr>
-            </a:p>
-          </p:txBody>
-        </p:sp>
-        <p:sp>
-          <p:nvSpPr>
-            <p:cNvPr id="16" name="Donut 15">
-              <a:extLst>
-                <a:ext uri="{FF2B5EF4-FFF2-40B4-BE49-F238E27FC236}">
-                  <a16:creationId xmlns:a16="http://schemas.microsoft.com/office/drawing/2014/main" id="{957B701D-E9E5-0707-7C01-A0B0AEA9CBAD}"/>
-                </a:ext>
-              </a:extLst>
-            </p:cNvPr>
-            <p:cNvSpPr/>
-            <p:nvPr/>
-          </p:nvSpPr>
-          <p:spPr>
-            <a:xfrm>
-              <a:off x="5832019" y="3758114"/>
-              <a:ext cx="554477" cy="554477"/>
-            </a:xfrm>
-            <a:prstGeom prst="donut">
-              <a:avLst>
-                <a:gd name="adj" fmla="val 12350"/>
-              </a:avLst>
-            </a:prstGeom>
-            <a:solidFill>
-              <a:schemeClr val="tx1"/>
-            </a:solidFill>
-            <a:ln>
-              <a:solidFill>
-                <a:schemeClr val="tx1"/>
-              </a:solidFill>
-            </a:ln>
-          </p:spPr>
-          <p:style>
-            <a:lnRef idx="2">
-              <a:schemeClr val="accent1">
-                <a:shade val="50000"/>
-              </a:schemeClr>
-            </a:lnRef>
-            <a:fillRef idx="1">
-              <a:schemeClr val="accent1"/>
-            </a:fillRef>
-            <a:effectRef idx="0">
-              <a:schemeClr val="accent1"/>
-            </a:effectRef>
-            <a:fontRef idx="minor">
-              <a:schemeClr val="lt1"/>
-            </a:fontRef>
-          </p:style>
-          <p:txBody>
-            <a:bodyPr rtlCol="0" anchor="ctr"/>
-            <a:lstStyle/>
-            <a:p>
-              <a:pPr algn="ctr"/>
-              <a:endParaRPr lang="en-US">
-                <a:solidFill>
-                  <a:schemeClr val="tx1"/>
-                </a:solidFill>
-              </a:endParaRPr>
-            </a:p>
-          </p:txBody>
-        </p:sp>
-        <p:sp>
-          <p:nvSpPr>
-            <p:cNvPr id="17" name="Donut 16">
-              <a:extLst>
-                <a:ext uri="{FF2B5EF4-FFF2-40B4-BE49-F238E27FC236}">
-                  <a16:creationId xmlns:a16="http://schemas.microsoft.com/office/drawing/2014/main" id="{BB0D80F6-0912-EB88-0CD3-4AE765E9C720}"/>
-                </a:ext>
-              </a:extLst>
-            </p:cNvPr>
-            <p:cNvSpPr/>
-            <p:nvPr/>
-          </p:nvSpPr>
-          <p:spPr>
-            <a:xfrm>
-              <a:off x="6805363" y="3745145"/>
-              <a:ext cx="554477" cy="554477"/>
-            </a:xfrm>
-            <a:prstGeom prst="donut">
-              <a:avLst>
-                <a:gd name="adj" fmla="val 12350"/>
-              </a:avLst>
-            </a:prstGeom>
-            <a:solidFill>
-              <a:schemeClr val="tx1"/>
-            </a:solidFill>
-            <a:ln>
-              <a:solidFill>
-                <a:schemeClr val="tx1"/>
-              </a:solidFill>
-            </a:ln>
-          </p:spPr>
-          <p:style>
-            <a:lnRef idx="2">
-              <a:schemeClr val="accent1">
-                <a:shade val="50000"/>
-              </a:schemeClr>
-            </a:lnRef>
-            <a:fillRef idx="1">
-              <a:schemeClr val="accent1"/>
-            </a:fillRef>
-            <a:effectRef idx="0">
-              <a:schemeClr val="accent1"/>
-            </a:effectRef>
-            <a:fontRef idx="minor">
-              <a:schemeClr val="lt1"/>
-            </a:fontRef>
-          </p:style>
-          <p:txBody>
-            <a:bodyPr rtlCol="0" anchor="ctr"/>
-            <a:lstStyle/>
-            <a:p>
-              <a:pPr algn="ctr"/>
-              <a:endParaRPr lang="en-US">
-                <a:solidFill>
-                  <a:schemeClr val="tx1"/>
-                </a:solidFill>
-              </a:endParaRPr>
-            </a:p>
-          </p:txBody>
-        </p:sp>
-        <p:sp>
-          <p:nvSpPr>
-            <p:cNvPr id="18" name="Donut 17">
-              <a:extLst>
-                <a:ext uri="{FF2B5EF4-FFF2-40B4-BE49-F238E27FC236}">
-                  <a16:creationId xmlns:a16="http://schemas.microsoft.com/office/drawing/2014/main" id="{B162AB8C-9D19-9C1F-74C3-14DBF5AAD611}"/>
-                </a:ext>
-              </a:extLst>
-            </p:cNvPr>
-            <p:cNvSpPr/>
-            <p:nvPr/>
-          </p:nvSpPr>
-          <p:spPr>
-            <a:xfrm>
-              <a:off x="7778707" y="3745144"/>
-              <a:ext cx="554477" cy="554477"/>
-            </a:xfrm>
-            <a:prstGeom prst="donut">
-              <a:avLst>
-                <a:gd name="adj" fmla="val 12350"/>
-              </a:avLst>
-            </a:prstGeom>
-            <a:solidFill>
-              <a:schemeClr val="tx1"/>
-            </a:solidFill>
-            <a:ln>
-              <a:solidFill>
-                <a:schemeClr val="tx1"/>
-              </a:solidFill>
-            </a:ln>
-          </p:spPr>
-          <p:style>
-            <a:lnRef idx="2">
-              <a:schemeClr val="accent1">
-                <a:shade val="50000"/>
-              </a:schemeClr>
-            </a:lnRef>
-            <a:fillRef idx="1">
-              <a:schemeClr val="accent1"/>
-            </a:fillRef>
-            <a:effectRef idx="0">
-              <a:schemeClr val="accent1"/>
-            </a:effectRef>
-            <a:fontRef idx="minor">
-              <a:schemeClr val="lt1"/>
-            </a:fontRef>
-          </p:style>
-          <p:txBody>
-            <a:bodyPr rtlCol="0" anchor="ctr"/>
-            <a:lstStyle/>
-            <a:p>
-              <a:pPr algn="ctr"/>
-              <a:endParaRPr lang="en-US">
-                <a:solidFill>
-                  <a:schemeClr val="tx1"/>
-                </a:solidFill>
-              </a:endParaRPr>
-            </a:p>
-          </p:txBody>
-        </p:sp>
-      </p:grpSp>
-      <p:cxnSp>
-        <p:nvCxnSpPr>
-          <p:cNvPr id="6" name="Curved Connector 5">
+          <a:prstGeom prst="rect">
+            <a:avLst/>
+          </a:prstGeom>
+        </p:spPr>
+      </p:pic>
+      <p:sp>
+        <p:nvSpPr>
+          <p:cNvPr id="6" name="Rectangle 5">
             <a:extLst>
               <a:ext uri="{FF2B5EF4-FFF2-40B4-BE49-F238E27FC236}">
-                <a16:creationId xmlns:a16="http://schemas.microsoft.com/office/drawing/2014/main" id="{13A05442-11E6-16C3-74C7-F4DEC5C3DB72}"/>
+                <a16:creationId xmlns:a16="http://schemas.microsoft.com/office/drawing/2014/main" id="{981F496C-B221-4D44-0044-4ED1578D4239}"/>
               </a:ext>
             </a:extLst>
           </p:cNvPr>
-          <p:cNvCxnSpPr>
-            <a:cxnSpLocks/>
-            <a:stCxn id="2" idx="0"/>
-            <a:endCxn id="3" idx="2"/>
-          </p:cNvCxnSpPr>
+          <p:cNvSpPr/>
           <p:nvPr/>
-        </p:nvCxnSpPr>
+        </p:nvSpPr>
         <p:spPr>
-          <a:xfrm rot="5400000" flipH="1" flipV="1">
-            <a:off x="5128186" y="2069562"/>
-            <a:ext cx="669586" cy="716601"/>
+          <a:xfrm>
+            <a:off x="1673157" y="311285"/>
+            <a:ext cx="1712069" cy="622570"/>
           </a:xfrm>
-          <a:prstGeom prst="curvedConnector2">
+          <a:prstGeom prst="rect">
             <a:avLst/>
           </a:prstGeom>
-          <a:ln w="44450">
+          <a:solidFill>
+            <a:schemeClr val="bg1"/>
+          </a:solidFill>
+          <a:ln>
             <a:solidFill>
-              <a:srgbClr val="FF0000"/>
+              <a:schemeClr val="bg1"/>
             </a:solidFill>
-            <a:tailEnd type="triangle"/>
           </a:ln>
         </p:spPr>
         <p:style>
-          <a:lnRef idx="1">
-            <a:schemeClr val="accent1"/>
+          <a:lnRef idx="2">
+            <a:schemeClr val="accent1">
+              <a:shade val="50000"/>
+            </a:schemeClr>
           </a:lnRef>
-          <a:fillRef idx="0">
+          <a:fillRef idx="1">
             <a:schemeClr val="accent1"/>
           </a:fillRef>
           <a:effectRef idx="0">
             <a:schemeClr val="accent1"/>
           </a:effectRef>
           <a:fontRef idx="minor">
-            <a:schemeClr val="tx1"/>
+            <a:schemeClr val="lt1"/>
           </a:fontRef>
         </p:style>
-      </p:cxnSp>
-      <p:cxnSp>
-        <p:nvCxnSpPr>
-          <p:cNvPr id="26" name="Curved Connector 25">
+        <p:txBody>
+          <a:bodyPr rtlCol="0" anchor="ctr"/>
+          <a:lstStyle/>
+          <a:p>
+            <a:pPr algn="ctr"/>
+            <a:endParaRPr lang="en-US"/>
+          </a:p>
+        </p:txBody>
+      </p:sp>
+      <p:sp>
+        <p:nvSpPr>
+          <p:cNvPr id="2" name="TextBox 1">
             <a:extLst>
               <a:ext uri="{FF2B5EF4-FFF2-40B4-BE49-F238E27FC236}">
-                <a16:creationId xmlns:a16="http://schemas.microsoft.com/office/drawing/2014/main" id="{64BF63CC-F84D-B953-8CD4-FDA6B5CCFB11}"/>
-              </a:ext>
-            </a:extLst>
-          </p:cNvPr>
-          <p:cNvCxnSpPr>
-            <a:cxnSpLocks/>
-            <a:stCxn id="2" idx="2"/>
-            <a:endCxn id="14" idx="0"/>
-          </p:cNvCxnSpPr>
-          <p:nvPr/>
-        </p:nvCxnSpPr>
-        <p:spPr>
-          <a:xfrm rot="10800000" flipV="1">
-            <a:off x="4133534" y="3039893"/>
-            <a:ext cx="693906" cy="705253"/>
-          </a:xfrm>
-          <a:prstGeom prst="curvedConnector2">
-            <a:avLst/>
-          </a:prstGeom>
-          <a:ln w="44450">
-            <a:solidFill>
-              <a:srgbClr val="FF0000"/>
-            </a:solidFill>
-            <a:tailEnd type="triangle"/>
-          </a:ln>
-        </p:spPr>
-        <p:style>
-          <a:lnRef idx="1">
-            <a:schemeClr val="accent1"/>
-          </a:lnRef>
-          <a:fillRef idx="0">
-            <a:schemeClr val="accent1"/>
-          </a:fillRef>
-          <a:effectRef idx="0">
-            <a:schemeClr val="accent1"/>
-          </a:effectRef>
-          <a:fontRef idx="minor">
-            <a:schemeClr val="tx1"/>
-          </a:fontRef>
-        </p:style>
-      </p:cxnSp>
-      <p:cxnSp>
-        <p:nvCxnSpPr>
-          <p:cNvPr id="41" name="Curved Connector 40">
-            <a:extLst>
-              <a:ext uri="{FF2B5EF4-FFF2-40B4-BE49-F238E27FC236}">
-                <a16:creationId xmlns:a16="http://schemas.microsoft.com/office/drawing/2014/main" id="{C781B262-4846-B76C-338F-D2FBAC2FEBB1}"/>
-              </a:ext>
-            </a:extLst>
-          </p:cNvPr>
-          <p:cNvCxnSpPr>
-            <a:cxnSpLocks/>
-            <a:stCxn id="2" idx="4"/>
-            <a:endCxn id="16" idx="2"/>
-          </p:cNvCxnSpPr>
-          <p:nvPr/>
-        </p:nvCxnSpPr>
-        <p:spPr>
-          <a:xfrm rot="16200000" flipH="1">
-            <a:off x="5110499" y="3311312"/>
-            <a:ext cx="718221" cy="729860"/>
-          </a:xfrm>
-          <a:prstGeom prst="curvedConnector2">
-            <a:avLst/>
-          </a:prstGeom>
-          <a:ln w="44450">
-            <a:solidFill>
-              <a:srgbClr val="FF0000"/>
-            </a:solidFill>
-            <a:tailEnd type="triangle"/>
-          </a:ln>
-        </p:spPr>
-        <p:style>
-          <a:lnRef idx="1">
-            <a:schemeClr val="accent1"/>
-          </a:lnRef>
-          <a:fillRef idx="0">
-            <a:schemeClr val="accent1"/>
-          </a:fillRef>
-          <a:effectRef idx="0">
-            <a:schemeClr val="accent1"/>
-          </a:effectRef>
-          <a:fontRef idx="minor">
-            <a:schemeClr val="tx1"/>
-          </a:fontRef>
-        </p:style>
-      </p:cxnSp>
-      <p:sp>
-        <p:nvSpPr>
-          <p:cNvPr id="5" name="TextBox 4">
-            <a:extLst>
-              <a:ext uri="{FF2B5EF4-FFF2-40B4-BE49-F238E27FC236}">
-                <a16:creationId xmlns:a16="http://schemas.microsoft.com/office/drawing/2014/main" id="{6E7EC0AA-A98E-7E6F-6F23-9CCA64BFF58F}"/>
+                <a16:creationId xmlns:a16="http://schemas.microsoft.com/office/drawing/2014/main" id="{F59B5CC5-653E-5254-DBEB-3338FFFE7EF4}"/>
               </a:ext>
             </a:extLst>
           </p:cNvPr>
@@ -13082,8 +11961,8 @@
         </p:nvSpPr>
         <p:spPr>
           <a:xfrm>
-            <a:off x="2893491" y="4545469"/>
-            <a:ext cx="6405017" cy="523220"/>
+            <a:off x="554477" y="544749"/>
+            <a:ext cx="4912468" cy="369332"/>
           </a:xfrm>
           <a:prstGeom prst="rect">
             <a:avLst/>
@@ -13097,73 +11976,8 @@
           <a:lstStyle/>
           <a:p>
             <a:r>
-              <a:rPr lang="en-US" sz="2800" dirty="0"/>
-              <a:t>There are 36 possible jumps on the board</a:t>
-            </a:r>
-          </a:p>
-        </p:txBody>
-      </p:sp>
-      <p:sp>
-        <p:nvSpPr>
-          <p:cNvPr id="20" name="TextBox 19">
-            <a:extLst>
-              <a:ext uri="{FF2B5EF4-FFF2-40B4-BE49-F238E27FC236}">
-                <a16:creationId xmlns:a16="http://schemas.microsoft.com/office/drawing/2014/main" id="{89ABD41B-362E-BA9F-3E17-39203B8931DF}"/>
-              </a:ext>
-            </a:extLst>
-          </p:cNvPr>
-          <p:cNvSpPr txBox="1"/>
-          <p:nvPr/>
-        </p:nvSpPr>
-        <p:spPr>
-          <a:xfrm>
-            <a:off x="8259357" y="811529"/>
-            <a:ext cx="3020993" cy="2677656"/>
-          </a:xfrm>
-          <a:prstGeom prst="rect">
-            <a:avLst/>
-          </a:prstGeom>
-          <a:noFill/>
-        </p:spPr>
-        <p:txBody>
-          <a:bodyPr wrap="square" rtlCol="0">
-            <a:spAutoFit/>
-          </a:bodyPr>
-          <a:lstStyle/>
-          <a:p>
-            <a:r>
-              <a:rPr lang="en-US" sz="2800" dirty="0"/>
-              <a:t>Jump has</a:t>
-            </a:r>
-          </a:p>
-          <a:p>
-            <a:r>
-              <a:rPr lang="en-US" sz="2800" dirty="0"/>
-              <a:t>   start, over, to</a:t>
-            </a:r>
-          </a:p>
-          <a:p>
-            <a:r>
-              <a:rPr lang="en-US" sz="2800" dirty="0"/>
-              <a:t>To be valid, </a:t>
-            </a:r>
-          </a:p>
-          <a:p>
-            <a:r>
-              <a:rPr lang="en-US" sz="2800" dirty="0"/>
-              <a:t>   start is full</a:t>
-            </a:r>
-          </a:p>
-          <a:p>
-            <a:r>
-              <a:rPr lang="en-US" sz="2800" dirty="0"/>
-              <a:t>   over is full</a:t>
-            </a:r>
-          </a:p>
-          <a:p>
-            <a:r>
-              <a:rPr lang="en-US" sz="2800" dirty="0"/>
-              <a:t>   to is empty</a:t>
+              <a:rPr lang="en-US" dirty="0"/>
+              <a:t>If we start here - what are possible next states?</a:t>
             </a:r>
           </a:p>
         </p:txBody>
@@ -13171,7 +11985,7 @@
     </p:spTree>
     <p:extLst>
       <p:ext uri="{BB962C8B-B14F-4D97-AF65-F5344CB8AC3E}">
-        <p14:creationId xmlns:p14="http://schemas.microsoft.com/office/powerpoint/2010/main" val="4101319231"/>
+        <p14:creationId xmlns:p14="http://schemas.microsoft.com/office/powerpoint/2010/main" val="3359691348"/>
       </p:ext>
     </p:extLst>
   </p:cSld>

</xml_diff>